<commit_message>
added Overview image (+ + = )
</commit_message>
<xml_diff>
--- a/layered-config-parser/docs/config-parser.pptx
+++ b/layered-config-parser/docs/config-parser.pptx
@@ -7,6 +7,7 @@
   <p:sldIdLst>
     <p:sldId id="256" r:id="rId2"/>
     <p:sldId id="257" r:id="rId3"/>
+    <p:sldId id="258" r:id="rId4"/>
   </p:sldIdLst>
   <p:sldSz cx="12192000" cy="6858000"/>
   <p:notesSz cx="6858000" cy="9144000"/>
@@ -105,6 +106,11 @@
       </a:defRPr>
     </a:lvl9pPr>
   </p:defaultTextStyle>
+  <p:extLst>
+    <p:ext uri="{EFAFB233-063F-42B5-8137-9DF3F51BA10A}">
+      <p15:sldGuideLst xmlns:p15="http://schemas.microsoft.com/office/powerpoint/2012/main"/>
+    </p:ext>
+  </p:extLst>
 </p:presentation>
 </file>
 
@@ -257,7 +263,7 @@
           <a:p>
             <a:fld id="{660E623B-E821-47F9-99FD-CEF5B2DF5CBA}" type="datetimeFigureOut">
               <a:rPr lang="en-GB" smtClean="0"/>
-              <a:t>05/11/2023</a:t>
+              <a:t>06/11/2023</a:t>
             </a:fld>
             <a:endParaRPr lang="en-GB"/>
           </a:p>
@@ -457,7 +463,7 @@
           <a:p>
             <a:fld id="{660E623B-E821-47F9-99FD-CEF5B2DF5CBA}" type="datetimeFigureOut">
               <a:rPr lang="en-GB" smtClean="0"/>
-              <a:t>05/11/2023</a:t>
+              <a:t>06/11/2023</a:t>
             </a:fld>
             <a:endParaRPr lang="en-GB"/>
           </a:p>
@@ -667,7 +673,7 @@
           <a:p>
             <a:fld id="{660E623B-E821-47F9-99FD-CEF5B2DF5CBA}" type="datetimeFigureOut">
               <a:rPr lang="en-GB" smtClean="0"/>
-              <a:t>05/11/2023</a:t>
+              <a:t>06/11/2023</a:t>
             </a:fld>
             <a:endParaRPr lang="en-GB"/>
           </a:p>
@@ -867,7 +873,7 @@
           <a:p>
             <a:fld id="{660E623B-E821-47F9-99FD-CEF5B2DF5CBA}" type="datetimeFigureOut">
               <a:rPr lang="en-GB" smtClean="0"/>
-              <a:t>05/11/2023</a:t>
+              <a:t>06/11/2023</a:t>
             </a:fld>
             <a:endParaRPr lang="en-GB"/>
           </a:p>
@@ -1143,7 +1149,7 @@
           <a:p>
             <a:fld id="{660E623B-E821-47F9-99FD-CEF5B2DF5CBA}" type="datetimeFigureOut">
               <a:rPr lang="en-GB" smtClean="0"/>
-              <a:t>05/11/2023</a:t>
+              <a:t>06/11/2023</a:t>
             </a:fld>
             <a:endParaRPr lang="en-GB"/>
           </a:p>
@@ -1411,7 +1417,7 @@
           <a:p>
             <a:fld id="{660E623B-E821-47F9-99FD-CEF5B2DF5CBA}" type="datetimeFigureOut">
               <a:rPr lang="en-GB" smtClean="0"/>
-              <a:t>05/11/2023</a:t>
+              <a:t>06/11/2023</a:t>
             </a:fld>
             <a:endParaRPr lang="en-GB"/>
           </a:p>
@@ -1826,7 +1832,7 @@
           <a:p>
             <a:fld id="{660E623B-E821-47F9-99FD-CEF5B2DF5CBA}" type="datetimeFigureOut">
               <a:rPr lang="en-GB" smtClean="0"/>
-              <a:t>05/11/2023</a:t>
+              <a:t>06/11/2023</a:t>
             </a:fld>
             <a:endParaRPr lang="en-GB"/>
           </a:p>
@@ -1968,7 +1974,7 @@
           <a:p>
             <a:fld id="{660E623B-E821-47F9-99FD-CEF5B2DF5CBA}" type="datetimeFigureOut">
               <a:rPr lang="en-GB" smtClean="0"/>
-              <a:t>05/11/2023</a:t>
+              <a:t>06/11/2023</a:t>
             </a:fld>
             <a:endParaRPr lang="en-GB"/>
           </a:p>
@@ -2081,7 +2087,7 @@
           <a:p>
             <a:fld id="{660E623B-E821-47F9-99FD-CEF5B2DF5CBA}" type="datetimeFigureOut">
               <a:rPr lang="en-GB" smtClean="0"/>
-              <a:t>05/11/2023</a:t>
+              <a:t>06/11/2023</a:t>
             </a:fld>
             <a:endParaRPr lang="en-GB"/>
           </a:p>
@@ -2394,7 +2400,7 @@
           <a:p>
             <a:fld id="{660E623B-E821-47F9-99FD-CEF5B2DF5CBA}" type="datetimeFigureOut">
               <a:rPr lang="en-GB" smtClean="0"/>
-              <a:t>05/11/2023</a:t>
+              <a:t>06/11/2023</a:t>
             </a:fld>
             <a:endParaRPr lang="en-GB"/>
           </a:p>
@@ -2683,7 +2689,7 @@
           <a:p>
             <a:fld id="{660E623B-E821-47F9-99FD-CEF5B2DF5CBA}" type="datetimeFigureOut">
               <a:rPr lang="en-GB" smtClean="0"/>
-              <a:t>05/11/2023</a:t>
+              <a:t>06/11/2023</a:t>
             </a:fld>
             <a:endParaRPr lang="en-GB"/>
           </a:p>
@@ -2926,7 +2932,7 @@
           <a:p>
             <a:fld id="{660E623B-E821-47F9-99FD-CEF5B2DF5CBA}" type="datetimeFigureOut">
               <a:rPr lang="en-GB" smtClean="0"/>
-              <a:t>05/11/2023</a:t>
+              <a:t>06/11/2023</a:t>
             </a:fld>
             <a:endParaRPr lang="en-GB"/>
           </a:p>
@@ -4439,6 +4445,371 @@
 </p:sld>
 </file>
 
+<file path=ppt/slides/slide3.xml><?xml version="1.0" encoding="utf-8"?>
+<p:sld xmlns:a="http://schemas.openxmlformats.org/drawingml/2006/main" xmlns:r="http://schemas.openxmlformats.org/officeDocument/2006/relationships" xmlns:p="http://schemas.openxmlformats.org/presentationml/2006/main">
+  <p:cSld>
+    <p:spTree>
+      <p:nvGrpSpPr>
+        <p:cNvPr id="1" name=""/>
+        <p:cNvGrpSpPr/>
+        <p:nvPr/>
+      </p:nvGrpSpPr>
+      <p:grpSpPr>
+        <a:xfrm>
+          <a:off x="0" y="0"/>
+          <a:ext cx="0" cy="0"/>
+          <a:chOff x="0" y="0"/>
+          <a:chExt cx="0" cy="0"/>
+        </a:xfrm>
+      </p:grpSpPr>
+      <p:sp>
+        <p:nvSpPr>
+          <p:cNvPr id="2" name="TextBox 1">
+            <a:extLst>
+              <a:ext uri="{FF2B5EF4-FFF2-40B4-BE49-F238E27FC236}">
+                <a16:creationId xmlns:a16="http://schemas.microsoft.com/office/drawing/2014/main" id="{26BB2429-5165-85E1-DDFB-FF11D00130AE}"/>
+              </a:ext>
+            </a:extLst>
+          </p:cNvPr>
+          <p:cNvSpPr txBox="1"/>
+          <p:nvPr/>
+        </p:nvSpPr>
+        <p:spPr>
+          <a:xfrm>
+            <a:off x="3598265" y="955681"/>
+            <a:ext cx="4795154" cy="369332"/>
+          </a:xfrm>
+          <a:prstGeom prst="rect">
+            <a:avLst/>
+          </a:prstGeom>
+          <a:solidFill>
+            <a:schemeClr val="accent1">
+              <a:lumMod val="20000"/>
+              <a:lumOff val="80000"/>
+            </a:schemeClr>
+          </a:solidFill>
+          <a:ln>
+            <a:solidFill>
+              <a:schemeClr val="accent1"/>
+            </a:solidFill>
+          </a:ln>
+        </p:spPr>
+        <p:txBody>
+          <a:bodyPr wrap="square" rtlCol="0">
+            <a:spAutoFit/>
+          </a:bodyPr>
+          <a:lstStyle/>
+          <a:p>
+            <a:pPr algn="ctr"/>
+            <a:r>
+              <a:rPr lang="en-GB" dirty="0"/>
+              <a:t>Base settings</a:t>
+            </a:r>
+            <a:r>
+              <a:rPr lang="en-GB" b="1" dirty="0"/>
+              <a:t>.ini</a:t>
+            </a:r>
+            <a:r>
+              <a:rPr lang="en-GB" dirty="0"/>
+              <a:t> file</a:t>
+            </a:r>
+          </a:p>
+        </p:txBody>
+      </p:sp>
+      <p:sp>
+        <p:nvSpPr>
+          <p:cNvPr id="4" name="TextBox 3">
+            <a:extLst>
+              <a:ext uri="{FF2B5EF4-FFF2-40B4-BE49-F238E27FC236}">
+                <a16:creationId xmlns:a16="http://schemas.microsoft.com/office/drawing/2014/main" id="{602BD256-8E6B-227B-9CEB-EAE568E90542}"/>
+              </a:ext>
+            </a:extLst>
+          </p:cNvPr>
+          <p:cNvSpPr txBox="1"/>
+          <p:nvPr/>
+        </p:nvSpPr>
+        <p:spPr>
+          <a:xfrm>
+            <a:off x="3598265" y="2181106"/>
+            <a:ext cx="4795154" cy="369332"/>
+          </a:xfrm>
+          <a:prstGeom prst="rect">
+            <a:avLst/>
+          </a:prstGeom>
+          <a:solidFill>
+            <a:schemeClr val="accent1">
+              <a:lumMod val="20000"/>
+              <a:lumOff val="80000"/>
+            </a:schemeClr>
+          </a:solidFill>
+          <a:ln>
+            <a:solidFill>
+              <a:schemeClr val="accent1"/>
+            </a:solidFill>
+          </a:ln>
+        </p:spPr>
+        <p:txBody>
+          <a:bodyPr wrap="square" rtlCol="0">
+            <a:spAutoFit/>
+          </a:bodyPr>
+          <a:lstStyle/>
+          <a:p>
+            <a:pPr algn="ctr"/>
+            <a:r>
+              <a:rPr lang="en-GB" dirty="0"/>
+              <a:t>Environment specific settings(DEV/PROD)</a:t>
+            </a:r>
+            <a:r>
+              <a:rPr lang="en-GB" b="1" dirty="0"/>
+              <a:t>.ini</a:t>
+            </a:r>
+          </a:p>
+        </p:txBody>
+      </p:sp>
+      <p:sp>
+        <p:nvSpPr>
+          <p:cNvPr id="5" name="Plus Sign 4">
+            <a:extLst>
+              <a:ext uri="{FF2B5EF4-FFF2-40B4-BE49-F238E27FC236}">
+                <a16:creationId xmlns:a16="http://schemas.microsoft.com/office/drawing/2014/main" id="{6E5C8831-21AA-B5E6-29A2-1C2DD96CD871}"/>
+              </a:ext>
+            </a:extLst>
+          </p:cNvPr>
+          <p:cNvSpPr/>
+          <p:nvPr/>
+        </p:nvSpPr>
+        <p:spPr>
+          <a:xfrm>
+            <a:off x="5831633" y="1548872"/>
+            <a:ext cx="740229" cy="550506"/>
+          </a:xfrm>
+          <a:prstGeom prst="mathPlus">
+            <a:avLst/>
+          </a:prstGeom>
+        </p:spPr>
+        <p:style>
+          <a:lnRef idx="2">
+            <a:schemeClr val="accent1">
+              <a:shade val="15000"/>
+            </a:schemeClr>
+          </a:lnRef>
+          <a:fillRef idx="1">
+            <a:schemeClr val="accent1"/>
+          </a:fillRef>
+          <a:effectRef idx="0">
+            <a:schemeClr val="accent1"/>
+          </a:effectRef>
+          <a:fontRef idx="minor">
+            <a:schemeClr val="lt1"/>
+          </a:fontRef>
+        </p:style>
+        <p:txBody>
+          <a:bodyPr rtlCol="0" anchor="ctr"/>
+          <a:lstStyle/>
+          <a:p>
+            <a:pPr algn="ctr"/>
+            <a:endParaRPr lang="en-GB"/>
+          </a:p>
+        </p:txBody>
+      </p:sp>
+      <p:sp>
+        <p:nvSpPr>
+          <p:cNvPr id="6" name="Plus Sign 5">
+            <a:extLst>
+              <a:ext uri="{FF2B5EF4-FFF2-40B4-BE49-F238E27FC236}">
+                <a16:creationId xmlns:a16="http://schemas.microsoft.com/office/drawing/2014/main" id="{54625287-53CE-3246-DA33-F00DB45EEFF0}"/>
+              </a:ext>
+            </a:extLst>
+          </p:cNvPr>
+          <p:cNvSpPr/>
+          <p:nvPr/>
+        </p:nvSpPr>
+        <p:spPr>
+          <a:xfrm>
+            <a:off x="5831633" y="2698887"/>
+            <a:ext cx="740229" cy="550506"/>
+          </a:xfrm>
+          <a:prstGeom prst="mathPlus">
+            <a:avLst/>
+          </a:prstGeom>
+        </p:spPr>
+        <p:style>
+          <a:lnRef idx="2">
+            <a:schemeClr val="accent1">
+              <a:shade val="15000"/>
+            </a:schemeClr>
+          </a:lnRef>
+          <a:fillRef idx="1">
+            <a:schemeClr val="accent1"/>
+          </a:fillRef>
+          <a:effectRef idx="0">
+            <a:schemeClr val="accent1"/>
+          </a:effectRef>
+          <a:fontRef idx="minor">
+            <a:schemeClr val="lt1"/>
+          </a:fontRef>
+        </p:style>
+        <p:txBody>
+          <a:bodyPr rtlCol="0" anchor="ctr"/>
+          <a:lstStyle/>
+          <a:p>
+            <a:pPr algn="ctr"/>
+            <a:endParaRPr lang="en-GB"/>
+          </a:p>
+        </p:txBody>
+      </p:sp>
+      <p:sp>
+        <p:nvSpPr>
+          <p:cNvPr id="7" name="TextBox 6">
+            <a:extLst>
+              <a:ext uri="{FF2B5EF4-FFF2-40B4-BE49-F238E27FC236}">
+                <a16:creationId xmlns:a16="http://schemas.microsoft.com/office/drawing/2014/main" id="{24E9E573-600C-63D4-562B-72731EF2964A}"/>
+              </a:ext>
+            </a:extLst>
+          </p:cNvPr>
+          <p:cNvSpPr txBox="1"/>
+          <p:nvPr/>
+        </p:nvSpPr>
+        <p:spPr>
+          <a:xfrm>
+            <a:off x="3598265" y="3490495"/>
+            <a:ext cx="4795154" cy="369332"/>
+          </a:xfrm>
+          <a:prstGeom prst="rect">
+            <a:avLst/>
+          </a:prstGeom>
+          <a:solidFill>
+            <a:schemeClr val="accent1">
+              <a:lumMod val="20000"/>
+              <a:lumOff val="80000"/>
+            </a:schemeClr>
+          </a:solidFill>
+          <a:ln>
+            <a:solidFill>
+              <a:schemeClr val="accent1"/>
+            </a:solidFill>
+          </a:ln>
+        </p:spPr>
+        <p:txBody>
+          <a:bodyPr wrap="square" rtlCol="0">
+            <a:spAutoFit/>
+          </a:bodyPr>
+          <a:lstStyle/>
+          <a:p>
+            <a:pPr algn="ctr"/>
+            <a:r>
+              <a:rPr lang="en-GB" dirty="0"/>
+              <a:t>Environment variable overrides</a:t>
+            </a:r>
+          </a:p>
+        </p:txBody>
+      </p:sp>
+      <p:sp>
+        <p:nvSpPr>
+          <p:cNvPr id="8" name="Equals 7">
+            <a:extLst>
+              <a:ext uri="{FF2B5EF4-FFF2-40B4-BE49-F238E27FC236}">
+                <a16:creationId xmlns:a16="http://schemas.microsoft.com/office/drawing/2014/main" id="{624F07F3-8E68-7ADA-DF0F-C3C057725320}"/>
+              </a:ext>
+            </a:extLst>
+          </p:cNvPr>
+          <p:cNvSpPr/>
+          <p:nvPr/>
+        </p:nvSpPr>
+        <p:spPr>
+          <a:xfrm>
+            <a:off x="5937380" y="4250233"/>
+            <a:ext cx="556727" cy="257299"/>
+          </a:xfrm>
+          <a:prstGeom prst="mathEqual">
+            <a:avLst/>
+          </a:prstGeom>
+        </p:spPr>
+        <p:style>
+          <a:lnRef idx="2">
+            <a:schemeClr val="accent1">
+              <a:shade val="15000"/>
+            </a:schemeClr>
+          </a:lnRef>
+          <a:fillRef idx="1">
+            <a:schemeClr val="accent1"/>
+          </a:fillRef>
+          <a:effectRef idx="0">
+            <a:schemeClr val="accent1"/>
+          </a:effectRef>
+          <a:fontRef idx="minor">
+            <a:schemeClr val="lt1"/>
+          </a:fontRef>
+        </p:style>
+        <p:txBody>
+          <a:bodyPr rtlCol="0" anchor="ctr"/>
+          <a:lstStyle/>
+          <a:p>
+            <a:pPr algn="ctr"/>
+            <a:endParaRPr lang="en-GB">
+              <a:solidFill>
+                <a:schemeClr val="tx1"/>
+              </a:solidFill>
+            </a:endParaRPr>
+          </a:p>
+        </p:txBody>
+      </p:sp>
+      <p:sp>
+        <p:nvSpPr>
+          <p:cNvPr id="9" name="TextBox 8">
+            <a:extLst>
+              <a:ext uri="{FF2B5EF4-FFF2-40B4-BE49-F238E27FC236}">
+                <a16:creationId xmlns:a16="http://schemas.microsoft.com/office/drawing/2014/main" id="{FCFD76B6-AACC-8ED4-E662-CE2F1327CEAC}"/>
+              </a:ext>
+            </a:extLst>
+          </p:cNvPr>
+          <p:cNvSpPr txBox="1"/>
+          <p:nvPr/>
+        </p:nvSpPr>
+        <p:spPr>
+          <a:xfrm>
+            <a:off x="3698423" y="4843491"/>
+            <a:ext cx="4795154" cy="369332"/>
+          </a:xfrm>
+          <a:prstGeom prst="rect">
+            <a:avLst/>
+          </a:prstGeom>
+          <a:solidFill>
+            <a:srgbClr val="FFFF00"/>
+          </a:solidFill>
+          <a:ln>
+            <a:solidFill>
+              <a:schemeClr val="accent1"/>
+            </a:solidFill>
+          </a:ln>
+        </p:spPr>
+        <p:txBody>
+          <a:bodyPr wrap="square" rtlCol="0">
+            <a:spAutoFit/>
+          </a:bodyPr>
+          <a:lstStyle/>
+          <a:p>
+            <a:pPr algn="ctr"/>
+            <a:r>
+              <a:rPr lang="en-GB" b="1" dirty="0"/>
+              <a:t>Final configuration</a:t>
+            </a:r>
+          </a:p>
+        </p:txBody>
+      </p:sp>
+    </p:spTree>
+    <p:extLst>
+      <p:ext uri="{BB962C8B-B14F-4D97-AF65-F5344CB8AC3E}">
+        <p14:creationId xmlns:p14="http://schemas.microsoft.com/office/powerpoint/2010/main" val="1803236517"/>
+      </p:ext>
+    </p:extLst>
+  </p:cSld>
+  <p:clrMapOvr>
+    <a:masterClrMapping/>
+  </p:clrMapOvr>
+</p:sld>
+</file>
+
 <file path=ppt/theme/theme1.xml><?xml version="1.0" encoding="utf-8"?>
 <a:theme xmlns:a="http://schemas.openxmlformats.org/drawingml/2006/main" name="Office Theme">
   <a:themeElements>

</xml_diff>

<commit_message>
Putting it all together
</commit_message>
<xml_diff>
--- a/layered-config-parser/docs/config-parser.pptx
+++ b/layered-config-parser/docs/config-parser.pptx
@@ -9,6 +9,7 @@
     <p:sldId id="259" r:id="rId3"/>
     <p:sldId id="257" r:id="rId4"/>
     <p:sldId id="258" r:id="rId5"/>
+    <p:sldId id="260" r:id="rId6"/>
   </p:sldIdLst>
   <p:sldSz cx="12192000" cy="6858000"/>
   <p:notesSz cx="6858000" cy="9144000"/>
@@ -264,7 +265,7 @@
           <a:p>
             <a:fld id="{660E623B-E821-47F9-99FD-CEF5B2DF5CBA}" type="datetimeFigureOut">
               <a:rPr lang="en-GB" smtClean="0"/>
-              <a:t>06/11/2023</a:t>
+              <a:t>08/11/2023</a:t>
             </a:fld>
             <a:endParaRPr lang="en-GB"/>
           </a:p>
@@ -464,7 +465,7 @@
           <a:p>
             <a:fld id="{660E623B-E821-47F9-99FD-CEF5B2DF5CBA}" type="datetimeFigureOut">
               <a:rPr lang="en-GB" smtClean="0"/>
-              <a:t>06/11/2023</a:t>
+              <a:t>08/11/2023</a:t>
             </a:fld>
             <a:endParaRPr lang="en-GB"/>
           </a:p>
@@ -674,7 +675,7 @@
           <a:p>
             <a:fld id="{660E623B-E821-47F9-99FD-CEF5B2DF5CBA}" type="datetimeFigureOut">
               <a:rPr lang="en-GB" smtClean="0"/>
-              <a:t>06/11/2023</a:t>
+              <a:t>08/11/2023</a:t>
             </a:fld>
             <a:endParaRPr lang="en-GB"/>
           </a:p>
@@ -874,7 +875,7 @@
           <a:p>
             <a:fld id="{660E623B-E821-47F9-99FD-CEF5B2DF5CBA}" type="datetimeFigureOut">
               <a:rPr lang="en-GB" smtClean="0"/>
-              <a:t>06/11/2023</a:t>
+              <a:t>08/11/2023</a:t>
             </a:fld>
             <a:endParaRPr lang="en-GB"/>
           </a:p>
@@ -1150,7 +1151,7 @@
           <a:p>
             <a:fld id="{660E623B-E821-47F9-99FD-CEF5B2DF5CBA}" type="datetimeFigureOut">
               <a:rPr lang="en-GB" smtClean="0"/>
-              <a:t>06/11/2023</a:t>
+              <a:t>08/11/2023</a:t>
             </a:fld>
             <a:endParaRPr lang="en-GB"/>
           </a:p>
@@ -1418,7 +1419,7 @@
           <a:p>
             <a:fld id="{660E623B-E821-47F9-99FD-CEF5B2DF5CBA}" type="datetimeFigureOut">
               <a:rPr lang="en-GB" smtClean="0"/>
-              <a:t>06/11/2023</a:t>
+              <a:t>08/11/2023</a:t>
             </a:fld>
             <a:endParaRPr lang="en-GB"/>
           </a:p>
@@ -1833,7 +1834,7 @@
           <a:p>
             <a:fld id="{660E623B-E821-47F9-99FD-CEF5B2DF5CBA}" type="datetimeFigureOut">
               <a:rPr lang="en-GB" smtClean="0"/>
-              <a:t>06/11/2023</a:t>
+              <a:t>08/11/2023</a:t>
             </a:fld>
             <a:endParaRPr lang="en-GB"/>
           </a:p>
@@ -1975,7 +1976,7 @@
           <a:p>
             <a:fld id="{660E623B-E821-47F9-99FD-CEF5B2DF5CBA}" type="datetimeFigureOut">
               <a:rPr lang="en-GB" smtClean="0"/>
-              <a:t>06/11/2023</a:t>
+              <a:t>08/11/2023</a:t>
             </a:fld>
             <a:endParaRPr lang="en-GB"/>
           </a:p>
@@ -2088,7 +2089,7 @@
           <a:p>
             <a:fld id="{660E623B-E821-47F9-99FD-CEF5B2DF5CBA}" type="datetimeFigureOut">
               <a:rPr lang="en-GB" smtClean="0"/>
-              <a:t>06/11/2023</a:t>
+              <a:t>08/11/2023</a:t>
             </a:fld>
             <a:endParaRPr lang="en-GB"/>
           </a:p>
@@ -2401,7 +2402,7 @@
           <a:p>
             <a:fld id="{660E623B-E821-47F9-99FD-CEF5B2DF5CBA}" type="datetimeFigureOut">
               <a:rPr lang="en-GB" smtClean="0"/>
-              <a:t>06/11/2023</a:t>
+              <a:t>08/11/2023</a:t>
             </a:fld>
             <a:endParaRPr lang="en-GB"/>
           </a:p>
@@ -2690,7 +2691,7 @@
           <a:p>
             <a:fld id="{660E623B-E821-47F9-99FD-CEF5B2DF5CBA}" type="datetimeFigureOut">
               <a:rPr lang="en-GB" smtClean="0"/>
-              <a:t>06/11/2023</a:t>
+              <a:t>08/11/2023</a:t>
             </a:fld>
             <a:endParaRPr lang="en-GB"/>
           </a:p>
@@ -2933,7 +2934,7 @@
           <a:p>
             <a:fld id="{660E623B-E821-47F9-99FD-CEF5B2DF5CBA}" type="datetimeFigureOut">
               <a:rPr lang="en-GB" smtClean="0"/>
-              <a:t>06/11/2023</a:t>
+              <a:t>08/11/2023</a:t>
             </a:fld>
             <a:endParaRPr lang="en-GB"/>
           </a:p>
@@ -5783,6 +5784,425 @@
 </p:sld>
 </file>
 
+<file path=ppt/slides/slide5.xml><?xml version="1.0" encoding="utf-8"?>
+<p:sld xmlns:a="http://schemas.openxmlformats.org/drawingml/2006/main" xmlns:r="http://schemas.openxmlformats.org/officeDocument/2006/relationships" xmlns:p="http://schemas.openxmlformats.org/presentationml/2006/main">
+  <p:cSld>
+    <p:spTree>
+      <p:nvGrpSpPr>
+        <p:cNvPr id="1" name=""/>
+        <p:cNvGrpSpPr/>
+        <p:nvPr/>
+      </p:nvGrpSpPr>
+      <p:grpSpPr>
+        <a:xfrm>
+          <a:off x="0" y="0"/>
+          <a:ext cx="0" cy="0"/>
+          <a:chOff x="0" y="0"/>
+          <a:chExt cx="0" cy="0"/>
+        </a:xfrm>
+      </p:grpSpPr>
+      <p:pic>
+        <p:nvPicPr>
+          <p:cNvPr id="3" name="Picture 2">
+            <a:extLst>
+              <a:ext uri="{FF2B5EF4-FFF2-40B4-BE49-F238E27FC236}">
+                <a16:creationId xmlns:a16="http://schemas.microsoft.com/office/drawing/2014/main" id="{4AB077A6-2775-C413-FFCF-C5CB092BEC4C}"/>
+              </a:ext>
+            </a:extLst>
+          </p:cNvPr>
+          <p:cNvPicPr>
+            <a:picLocks noChangeAspect="1"/>
+          </p:cNvPicPr>
+          <p:nvPr/>
+        </p:nvPicPr>
+        <p:blipFill>
+          <a:blip r:embed="rId2"/>
+          <a:stretch>
+            <a:fillRect/>
+          </a:stretch>
+        </p:blipFill>
+        <p:spPr>
+          <a:xfrm>
+            <a:off x="1741811" y="762000"/>
+            <a:ext cx="3800475" cy="5334000"/>
+          </a:xfrm>
+          <a:prstGeom prst="rect">
+            <a:avLst/>
+          </a:prstGeom>
+        </p:spPr>
+      </p:pic>
+      <p:sp>
+        <p:nvSpPr>
+          <p:cNvPr id="4" name="Rectangle: Rounded Corners 3">
+            <a:extLst>
+              <a:ext uri="{FF2B5EF4-FFF2-40B4-BE49-F238E27FC236}">
+                <a16:creationId xmlns:a16="http://schemas.microsoft.com/office/drawing/2014/main" id="{8BA9BC62-2932-2539-20BB-2CDF02B6FB8E}"/>
+              </a:ext>
+            </a:extLst>
+          </p:cNvPr>
+          <p:cNvSpPr/>
+          <p:nvPr/>
+        </p:nvSpPr>
+        <p:spPr>
+          <a:xfrm>
+            <a:off x="2985796" y="4238206"/>
+            <a:ext cx="2388637" cy="679027"/>
+          </a:xfrm>
+          <a:prstGeom prst="roundRect">
+            <a:avLst/>
+          </a:prstGeom>
+          <a:noFill/>
+          <a:ln>
+            <a:prstDash val="dash"/>
+          </a:ln>
+        </p:spPr>
+        <p:style>
+          <a:lnRef idx="2">
+            <a:schemeClr val="accent1">
+              <a:shade val="15000"/>
+            </a:schemeClr>
+          </a:lnRef>
+          <a:fillRef idx="1">
+            <a:schemeClr val="accent1"/>
+          </a:fillRef>
+          <a:effectRef idx="0">
+            <a:schemeClr val="accent1"/>
+          </a:effectRef>
+          <a:fontRef idx="minor">
+            <a:schemeClr val="lt1"/>
+          </a:fontRef>
+        </p:style>
+        <p:txBody>
+          <a:bodyPr rtlCol="0" anchor="ctr"/>
+          <a:lstStyle/>
+          <a:p>
+            <a:pPr algn="ctr"/>
+            <a:endParaRPr lang="en-GB"/>
+          </a:p>
+        </p:txBody>
+      </p:sp>
+      <p:sp>
+        <p:nvSpPr>
+          <p:cNvPr id="5" name="Speech Bubble: Rectangle 4">
+            <a:extLst>
+              <a:ext uri="{FF2B5EF4-FFF2-40B4-BE49-F238E27FC236}">
+                <a16:creationId xmlns:a16="http://schemas.microsoft.com/office/drawing/2014/main" id="{7F1DA341-378D-C7B6-FBEB-ACA7B9C36196}"/>
+              </a:ext>
+            </a:extLst>
+          </p:cNvPr>
+          <p:cNvSpPr/>
+          <p:nvPr/>
+        </p:nvSpPr>
+        <p:spPr>
+          <a:xfrm>
+            <a:off x="6456784" y="2864498"/>
+            <a:ext cx="2351314" cy="363894"/>
+          </a:xfrm>
+          <a:prstGeom prst="wedgeRectCallout">
+            <a:avLst>
+              <a:gd name="adj1" fmla="val -145833"/>
+              <a:gd name="adj2" fmla="val 111050"/>
+            </a:avLst>
+          </a:prstGeom>
+        </p:spPr>
+        <p:style>
+          <a:lnRef idx="2">
+            <a:schemeClr val="accent1">
+              <a:shade val="15000"/>
+            </a:schemeClr>
+          </a:lnRef>
+          <a:fillRef idx="1">
+            <a:schemeClr val="accent1"/>
+          </a:fillRef>
+          <a:effectRef idx="0">
+            <a:schemeClr val="accent1"/>
+          </a:effectRef>
+          <a:fontRef idx="minor">
+            <a:schemeClr val="lt1"/>
+          </a:fontRef>
+        </p:style>
+        <p:txBody>
+          <a:bodyPr rtlCol="0" anchor="ctr"/>
+          <a:lstStyle/>
+          <a:p>
+            <a:pPr algn="ctr"/>
+            <a:r>
+              <a:rPr lang="en-GB" dirty="0"/>
+              <a:t>Base settings file</a:t>
+            </a:r>
+          </a:p>
+        </p:txBody>
+      </p:sp>
+      <p:sp>
+        <p:nvSpPr>
+          <p:cNvPr id="6" name="Speech Bubble: Rectangle 5">
+            <a:extLst>
+              <a:ext uri="{FF2B5EF4-FFF2-40B4-BE49-F238E27FC236}">
+                <a16:creationId xmlns:a16="http://schemas.microsoft.com/office/drawing/2014/main" id="{E510283E-1E60-719D-4CF8-EA6CD04E5D06}"/>
+              </a:ext>
+            </a:extLst>
+          </p:cNvPr>
+          <p:cNvSpPr/>
+          <p:nvPr/>
+        </p:nvSpPr>
+        <p:spPr>
+          <a:xfrm>
+            <a:off x="6456784" y="3401007"/>
+            <a:ext cx="2351314" cy="363894"/>
+          </a:xfrm>
+          <a:prstGeom prst="wedgeRectCallout">
+            <a:avLst>
+              <a:gd name="adj1" fmla="val -143849"/>
+              <a:gd name="adj2" fmla="val 62332"/>
+            </a:avLst>
+          </a:prstGeom>
+        </p:spPr>
+        <p:style>
+          <a:lnRef idx="2">
+            <a:schemeClr val="accent1">
+              <a:shade val="15000"/>
+            </a:schemeClr>
+          </a:lnRef>
+          <a:fillRef idx="1">
+            <a:schemeClr val="accent1"/>
+          </a:fillRef>
+          <a:effectRef idx="0">
+            <a:schemeClr val="accent1"/>
+          </a:effectRef>
+          <a:fontRef idx="minor">
+            <a:schemeClr val="lt1"/>
+          </a:fontRef>
+        </p:style>
+        <p:txBody>
+          <a:bodyPr rtlCol="0" anchor="ctr"/>
+          <a:lstStyle/>
+          <a:p>
+            <a:pPr algn="ctr"/>
+            <a:r>
+              <a:rPr lang="en-GB" b="1" dirty="0"/>
+              <a:t>PROD</a:t>
+            </a:r>
+            <a:r>
+              <a:rPr lang="en-GB" dirty="0"/>
+              <a:t> settings file</a:t>
+            </a:r>
+          </a:p>
+        </p:txBody>
+      </p:sp>
+      <p:sp>
+        <p:nvSpPr>
+          <p:cNvPr id="7" name="Speech Bubble: Rectangle 6">
+            <a:extLst>
+              <a:ext uri="{FF2B5EF4-FFF2-40B4-BE49-F238E27FC236}">
+                <a16:creationId xmlns:a16="http://schemas.microsoft.com/office/drawing/2014/main" id="{47D14736-111F-C994-DC48-8916028A0F21}"/>
+              </a:ext>
+            </a:extLst>
+          </p:cNvPr>
+          <p:cNvSpPr/>
+          <p:nvPr/>
+        </p:nvSpPr>
+        <p:spPr>
+          <a:xfrm>
+            <a:off x="6456784" y="2327989"/>
+            <a:ext cx="2351314" cy="363894"/>
+          </a:xfrm>
+          <a:prstGeom prst="wedgeRectCallout">
+            <a:avLst>
+              <a:gd name="adj1" fmla="val -142658"/>
+              <a:gd name="adj2" fmla="val 177717"/>
+            </a:avLst>
+          </a:prstGeom>
+        </p:spPr>
+        <p:style>
+          <a:lnRef idx="2">
+            <a:schemeClr val="accent1">
+              <a:shade val="15000"/>
+            </a:schemeClr>
+          </a:lnRef>
+          <a:fillRef idx="1">
+            <a:schemeClr val="accent1"/>
+          </a:fillRef>
+          <a:effectRef idx="0">
+            <a:schemeClr val="accent1"/>
+          </a:effectRef>
+          <a:fontRef idx="minor">
+            <a:schemeClr val="lt1"/>
+          </a:fontRef>
+        </p:style>
+        <p:txBody>
+          <a:bodyPr rtlCol="0" anchor="ctr"/>
+          <a:lstStyle/>
+          <a:p>
+            <a:pPr algn="ctr"/>
+            <a:r>
+              <a:rPr lang="en-GB" b="1" dirty="0"/>
+              <a:t>DEV</a:t>
+            </a:r>
+            <a:r>
+              <a:rPr lang="en-GB" dirty="0"/>
+              <a:t> settings file</a:t>
+            </a:r>
+          </a:p>
+        </p:txBody>
+      </p:sp>
+      <p:sp>
+        <p:nvSpPr>
+          <p:cNvPr id="8" name="Speech Bubble: Rectangle 7">
+            <a:extLst>
+              <a:ext uri="{FF2B5EF4-FFF2-40B4-BE49-F238E27FC236}">
+                <a16:creationId xmlns:a16="http://schemas.microsoft.com/office/drawing/2014/main" id="{F49B9F54-14B6-D983-0442-B6D0A2A1BD4B}"/>
+              </a:ext>
+            </a:extLst>
+          </p:cNvPr>
+          <p:cNvSpPr/>
+          <p:nvPr/>
+        </p:nvSpPr>
+        <p:spPr>
+          <a:xfrm>
+            <a:off x="6456784" y="1119674"/>
+            <a:ext cx="2351314" cy="587831"/>
+          </a:xfrm>
+          <a:prstGeom prst="wedgeRectCallout">
+            <a:avLst>
+              <a:gd name="adj1" fmla="val -142658"/>
+              <a:gd name="adj2" fmla="val 244383"/>
+            </a:avLst>
+          </a:prstGeom>
+        </p:spPr>
+        <p:style>
+          <a:lnRef idx="1">
+            <a:schemeClr val="accent4"/>
+          </a:lnRef>
+          <a:fillRef idx="3">
+            <a:schemeClr val="accent4"/>
+          </a:fillRef>
+          <a:effectRef idx="2">
+            <a:schemeClr val="accent4"/>
+          </a:effectRef>
+          <a:fontRef idx="minor">
+            <a:schemeClr val="lt1"/>
+          </a:fontRef>
+        </p:style>
+        <p:txBody>
+          <a:bodyPr rtlCol="0" anchor="ctr"/>
+          <a:lstStyle/>
+          <a:p>
+            <a:pPr algn="ctr"/>
+            <a:r>
+              <a:rPr lang="en-GB" dirty="0">
+                <a:solidFill>
+                  <a:schemeClr val="tx1"/>
+                </a:solidFill>
+              </a:rPr>
+              <a:t>Wrapper over </a:t>
+            </a:r>
+            <a:r>
+              <a:rPr lang="en-GB" b="1" dirty="0" err="1">
+                <a:solidFill>
+                  <a:schemeClr val="tx1"/>
+                </a:solidFill>
+              </a:rPr>
+              <a:t>ConfigParser</a:t>
+            </a:r>
+            <a:endParaRPr lang="en-GB" b="1" dirty="0">
+              <a:solidFill>
+                <a:schemeClr val="tx1"/>
+              </a:solidFill>
+            </a:endParaRPr>
+          </a:p>
+        </p:txBody>
+      </p:sp>
+      <p:sp>
+        <p:nvSpPr>
+          <p:cNvPr id="9" name="Speech Bubble: Rectangle 8">
+            <a:extLst>
+              <a:ext uri="{FF2B5EF4-FFF2-40B4-BE49-F238E27FC236}">
+                <a16:creationId xmlns:a16="http://schemas.microsoft.com/office/drawing/2014/main" id="{F245E2B7-2509-7EA4-C2C0-DF67713A9BB7}"/>
+              </a:ext>
+            </a:extLst>
+          </p:cNvPr>
+          <p:cNvSpPr/>
+          <p:nvPr/>
+        </p:nvSpPr>
+        <p:spPr>
+          <a:xfrm>
+            <a:off x="6456784" y="4231434"/>
+            <a:ext cx="2351314" cy="587831"/>
+          </a:xfrm>
+          <a:prstGeom prst="wedgeRectCallout">
+            <a:avLst>
+              <a:gd name="adj1" fmla="val -112499"/>
+              <a:gd name="adj2" fmla="val 25336"/>
+            </a:avLst>
+          </a:prstGeom>
+        </p:spPr>
+        <p:style>
+          <a:lnRef idx="1">
+            <a:schemeClr val="accent4"/>
+          </a:lnRef>
+          <a:fillRef idx="3">
+            <a:schemeClr val="accent4"/>
+          </a:fillRef>
+          <a:effectRef idx="2">
+            <a:schemeClr val="accent4"/>
+          </a:effectRef>
+          <a:fontRef idx="minor">
+            <a:schemeClr val="lt1"/>
+          </a:fontRef>
+        </p:style>
+        <p:txBody>
+          <a:bodyPr rtlCol="0" anchor="ctr"/>
+          <a:lstStyle/>
+          <a:p>
+            <a:pPr algn="ctr"/>
+            <a:r>
+              <a:rPr lang="en-GB" dirty="0">
+                <a:solidFill>
+                  <a:schemeClr val="tx1"/>
+                </a:solidFill>
+              </a:rPr>
+              <a:t>Consume </a:t>
+            </a:r>
+            <a:r>
+              <a:rPr lang="en-GB" b="1" dirty="0" err="1">
+                <a:solidFill>
+                  <a:schemeClr val="tx1"/>
+                </a:solidFill>
+              </a:rPr>
+              <a:t>ConfigParser</a:t>
+            </a:r>
+            <a:r>
+              <a:rPr lang="en-GB" b="1" dirty="0">
+                <a:solidFill>
+                  <a:schemeClr val="tx1"/>
+                </a:solidFill>
+              </a:rPr>
+              <a:t> </a:t>
+            </a:r>
+            <a:r>
+              <a:rPr lang="en-GB" dirty="0">
+                <a:solidFill>
+                  <a:schemeClr val="tx1"/>
+                </a:solidFill>
+              </a:rPr>
+              <a:t>here</a:t>
+            </a:r>
+          </a:p>
+        </p:txBody>
+      </p:sp>
+    </p:spTree>
+    <p:extLst>
+      <p:ext uri="{BB962C8B-B14F-4D97-AF65-F5344CB8AC3E}">
+        <p14:creationId xmlns:p14="http://schemas.microsoft.com/office/powerpoint/2010/main" val="4064366167"/>
+      </p:ext>
+    </p:extLst>
+  </p:cSld>
+  <p:clrMapOvr>
+    <a:masterClrMapping/>
+  </p:clrMapOvr>
+</p:sld>
+</file>
+
 <file path=ppt/theme/theme1.xml><?xml version="1.0" encoding="utf-8"?>
 <a:theme xmlns:a="http://schemas.openxmlformats.org/drawingml/2006/main" name="Office Theme">
   <a:themeElements>

</xml_diff>

<commit_message>
how to run the code
</commit_message>
<xml_diff>
--- a/layered-config-parser/docs/config-parser.pptx
+++ b/layered-config-parser/docs/config-parser.pptx
@@ -10,6 +10,8 @@
     <p:sldId id="257" r:id="rId4"/>
     <p:sldId id="258" r:id="rId5"/>
     <p:sldId id="260" r:id="rId6"/>
+    <p:sldId id="261" r:id="rId7"/>
+    <p:sldId id="262" r:id="rId8"/>
   </p:sldIdLst>
   <p:sldSz cx="12192000" cy="6858000"/>
   <p:notesSz cx="6858000" cy="9144000"/>
@@ -6203,6 +6205,126 @@
 </p:sld>
 </file>
 
+<file path=ppt/slides/slide6.xml><?xml version="1.0" encoding="utf-8"?>
+<p:sld xmlns:a="http://schemas.openxmlformats.org/drawingml/2006/main" xmlns:r="http://schemas.openxmlformats.org/officeDocument/2006/relationships" xmlns:p="http://schemas.openxmlformats.org/presentationml/2006/main">
+  <p:cSld>
+    <p:spTree>
+      <p:nvGrpSpPr>
+        <p:cNvPr id="1" name=""/>
+        <p:cNvGrpSpPr/>
+        <p:nvPr/>
+      </p:nvGrpSpPr>
+      <p:grpSpPr>
+        <a:xfrm>
+          <a:off x="0" y="0"/>
+          <a:ext cx="0" cy="0"/>
+          <a:chOff x="0" y="0"/>
+          <a:chExt cx="0" cy="0"/>
+        </a:xfrm>
+      </p:grpSpPr>
+      <p:pic>
+        <p:nvPicPr>
+          <p:cNvPr id="3" name="Picture 2">
+            <a:extLst>
+              <a:ext uri="{FF2B5EF4-FFF2-40B4-BE49-F238E27FC236}">
+                <a16:creationId xmlns:a16="http://schemas.microsoft.com/office/drawing/2014/main" id="{3F8293F0-749D-FDDF-444F-CFBF781C9F99}"/>
+              </a:ext>
+            </a:extLst>
+          </p:cNvPr>
+          <p:cNvPicPr>
+            <a:picLocks noChangeAspect="1"/>
+          </p:cNvPicPr>
+          <p:nvPr/>
+        </p:nvPicPr>
+        <p:blipFill>
+          <a:blip r:embed="rId2"/>
+          <a:stretch>
+            <a:fillRect/>
+          </a:stretch>
+        </p:blipFill>
+        <p:spPr>
+          <a:xfrm>
+            <a:off x="0" y="1139075"/>
+            <a:ext cx="12192000" cy="3049629"/>
+          </a:xfrm>
+          <a:prstGeom prst="rect">
+            <a:avLst/>
+          </a:prstGeom>
+        </p:spPr>
+      </p:pic>
+    </p:spTree>
+    <p:extLst>
+      <p:ext uri="{BB962C8B-B14F-4D97-AF65-F5344CB8AC3E}">
+        <p14:creationId xmlns:p14="http://schemas.microsoft.com/office/powerpoint/2010/main" val="1913777912"/>
+      </p:ext>
+    </p:extLst>
+  </p:cSld>
+  <p:clrMapOvr>
+    <a:masterClrMapping/>
+  </p:clrMapOvr>
+</p:sld>
+</file>
+
+<file path=ppt/slides/slide7.xml><?xml version="1.0" encoding="utf-8"?>
+<p:sld xmlns:a="http://schemas.openxmlformats.org/drawingml/2006/main" xmlns:r="http://schemas.openxmlformats.org/officeDocument/2006/relationships" xmlns:p="http://schemas.openxmlformats.org/presentationml/2006/main">
+  <p:cSld>
+    <p:spTree>
+      <p:nvGrpSpPr>
+        <p:cNvPr id="1" name=""/>
+        <p:cNvGrpSpPr/>
+        <p:nvPr/>
+      </p:nvGrpSpPr>
+      <p:grpSpPr>
+        <a:xfrm>
+          <a:off x="0" y="0"/>
+          <a:ext cx="0" cy="0"/>
+          <a:chOff x="0" y="0"/>
+          <a:chExt cx="0" cy="0"/>
+        </a:xfrm>
+      </p:grpSpPr>
+      <p:pic>
+        <p:nvPicPr>
+          <p:cNvPr id="3" name="Picture 2">
+            <a:extLst>
+              <a:ext uri="{FF2B5EF4-FFF2-40B4-BE49-F238E27FC236}">
+                <a16:creationId xmlns:a16="http://schemas.microsoft.com/office/drawing/2014/main" id="{AE3ECA19-0A4D-CD7E-A330-DD178E0C4E36}"/>
+              </a:ext>
+            </a:extLst>
+          </p:cNvPr>
+          <p:cNvPicPr>
+            <a:picLocks noChangeAspect="1"/>
+          </p:cNvPicPr>
+          <p:nvPr/>
+        </p:nvPicPr>
+        <p:blipFill>
+          <a:blip r:embed="rId2"/>
+          <a:stretch>
+            <a:fillRect/>
+          </a:stretch>
+        </p:blipFill>
+        <p:spPr>
+          <a:xfrm>
+            <a:off x="74645" y="2093638"/>
+            <a:ext cx="12192000" cy="935230"/>
+          </a:xfrm>
+          <a:prstGeom prst="rect">
+            <a:avLst/>
+          </a:prstGeom>
+        </p:spPr>
+      </p:pic>
+    </p:spTree>
+    <p:extLst>
+      <p:ext uri="{BB962C8B-B14F-4D97-AF65-F5344CB8AC3E}">
+        <p14:creationId xmlns:p14="http://schemas.microsoft.com/office/powerpoint/2010/main" val="1278014065"/>
+      </p:ext>
+    </p:extLst>
+  </p:cSld>
+  <p:clrMapOvr>
+    <a:masterClrMapping/>
+  </p:clrMapOvr>
+</p:sld>
+</file>
+
 <file path=ppt/theme/theme1.xml><?xml version="1.0" encoding="utf-8"?>
 <a:theme xmlns:a="http://schemas.openxmlformats.org/drawingml/2006/main" name="Office Theme">
   <a:themeElements>

</xml_diff>